<commit_message>
some fixes on pptx
</commit_message>
<xml_diff>
--- a/docs/final_report.pptx
+++ b/docs/final_report.pptx
@@ -10,8 +10,8 @@
     <p:sldId id="258" r:id="rId4"/>
     <p:sldId id="259" r:id="rId5"/>
     <p:sldId id="260" r:id="rId6"/>
-    <p:sldId id="261" r:id="rId7"/>
-    <p:sldId id="262" r:id="rId8"/>
+    <p:sldId id="265" r:id="rId7"/>
+    <p:sldId id="266" r:id="rId8"/>
     <p:sldId id="263" r:id="rId9"/>
     <p:sldId id="264" r:id="rId10"/>
   </p:sldIdLst>
@@ -123,7 +123,7 @@
 <file path=ppt/revisionInfo.xml><?xml version="1.0" encoding="utf-8"?>
 <p1510:revInfo xmlns:a="http://schemas.openxmlformats.org/drawingml/2006/main" xmlns:r="http://schemas.openxmlformats.org/officeDocument/2006/relationships" xmlns:p1510="http://schemas.microsoft.com/office/powerpoint/2015/10/main">
   <p1510:revLst>
-    <p1510:client id="{F9384AFB-4292-4E89-B21C-57023ED737FD}" v="16" dt="2023-05-19T18:27:44.088"/>
+    <p1510:client id="{F9384AFB-4292-4E89-B21C-57023ED737FD}" v="18" dt="2023-05-19T19:41:59.088"/>
   </p1510:revLst>
 </p1510:revInfo>
 </file>
@@ -133,7 +133,7 @@
   <pc:docChgLst>
     <pc:chgData name="André Costa" userId="19fc697903e1aad7" providerId="LiveId" clId="{F9384AFB-4292-4E89-B21C-57023ED737FD}"/>
     <pc:docChg chg="undo custSel addSld delSld modSld sldOrd">
-      <pc:chgData name="André Costa" userId="19fc697903e1aad7" providerId="LiveId" clId="{F9384AFB-4292-4E89-B21C-57023ED737FD}" dt="2023-05-19T18:32:38.761" v="2782" actId="14100"/>
+      <pc:chgData name="André Costa" userId="19fc697903e1aad7" providerId="LiveId" clId="{F9384AFB-4292-4E89-B21C-57023ED737FD}" dt="2023-05-19T19:42:01.047" v="2795" actId="47"/>
       <pc:docMkLst>
         <pc:docMk/>
       </pc:docMkLst>
@@ -348,8 +348,8 @@
           </ac:cxnSpMkLst>
         </pc:cxnChg>
       </pc:sldChg>
-      <pc:sldChg chg="addSp delSp modSp add mod setBg delDesignElem">
-        <pc:chgData name="André Costa" userId="19fc697903e1aad7" providerId="LiveId" clId="{F9384AFB-4292-4E89-B21C-57023ED737FD}" dt="2023-05-19T17:06:46.637" v="1814" actId="1076"/>
+      <pc:sldChg chg="addSp delSp modSp add del mod setBg delDesignElem">
+        <pc:chgData name="André Costa" userId="19fc697903e1aad7" providerId="LiveId" clId="{F9384AFB-4292-4E89-B21C-57023ED737FD}" dt="2023-05-19T19:41:26.673" v="2790" actId="47"/>
         <pc:sldMkLst>
           <pc:docMk/>
           <pc:sldMk cId="3295622502" sldId="261"/>
@@ -443,8 +443,8 @@
           </ac:picMkLst>
         </pc:picChg>
       </pc:sldChg>
-      <pc:sldChg chg="addSp delSp modSp add mod setBg delDesignElem">
-        <pc:chgData name="André Costa" userId="19fc697903e1aad7" providerId="LiveId" clId="{F9384AFB-4292-4E89-B21C-57023ED737FD}" dt="2023-05-19T18:32:17.090" v="2722" actId="14100"/>
+      <pc:sldChg chg="addSp delSp modSp add del mod setBg delDesignElem">
+        <pc:chgData name="André Costa" userId="19fc697903e1aad7" providerId="LiveId" clId="{F9384AFB-4292-4E89-B21C-57023ED737FD}" dt="2023-05-19T19:42:01.047" v="2795" actId="47"/>
         <pc:sldMkLst>
           <pc:docMk/>
           <pc:sldMk cId="3993840726" sldId="262"/>
@@ -929,6 +929,300 @@
             <ac:cxnSpMk id="17" creationId="{6CF1BAF6-AD41-4082-B212-8A1F9A2E8779}"/>
           </ac:cxnSpMkLst>
         </pc:cxnChg>
+      </pc:sldChg>
+      <pc:sldChg chg="addSp delSp modSp add mod">
+        <pc:chgData name="André Costa" userId="19fc697903e1aad7" providerId="LiveId" clId="{F9384AFB-4292-4E89-B21C-57023ED737FD}" dt="2023-05-19T19:41:16.351" v="2788"/>
+        <pc:sldMkLst>
+          <pc:docMk/>
+          <pc:sldMk cId="849564699" sldId="265"/>
+        </pc:sldMkLst>
+        <pc:spChg chg="del mod">
+          <ac:chgData name="André Costa" userId="19fc697903e1aad7" providerId="LiveId" clId="{F9384AFB-4292-4E89-B21C-57023ED737FD}" dt="2023-05-19T19:41:01.473" v="2786" actId="478"/>
+          <ac:spMkLst>
+            <pc:docMk/>
+            <pc:sldMk cId="849564699" sldId="265"/>
+            <ac:spMk id="2" creationId="{A3E5AD32-2BF4-A76D-607F-3633BB430573}"/>
+          </ac:spMkLst>
+        </pc:spChg>
+        <pc:spChg chg="del">
+          <ac:chgData name="André Costa" userId="19fc697903e1aad7" providerId="LiveId" clId="{F9384AFB-4292-4E89-B21C-57023ED737FD}" dt="2023-05-19T19:41:01.473" v="2786" actId="478"/>
+          <ac:spMkLst>
+            <pc:docMk/>
+            <pc:sldMk cId="849564699" sldId="265"/>
+            <ac:spMk id="3" creationId="{C9FF7FA9-CD0D-E0F8-F302-B0E747AF24A9}"/>
+          </ac:spMkLst>
+        </pc:spChg>
+        <pc:spChg chg="add del mod">
+          <ac:chgData name="André Costa" userId="19fc697903e1aad7" providerId="LiveId" clId="{F9384AFB-4292-4E89-B21C-57023ED737FD}" dt="2023-05-19T19:41:06.386" v="2787" actId="478"/>
+          <ac:spMkLst>
+            <pc:docMk/>
+            <pc:sldMk cId="849564699" sldId="265"/>
+            <ac:spMk id="6" creationId="{EEA45909-4403-A78C-F9D7-EA02EF5E3F3A}"/>
+          </ac:spMkLst>
+        </pc:spChg>
+        <pc:spChg chg="add mod">
+          <ac:chgData name="André Costa" userId="19fc697903e1aad7" providerId="LiveId" clId="{F9384AFB-4292-4E89-B21C-57023ED737FD}" dt="2023-05-19T19:41:16.351" v="2788"/>
+          <ac:spMkLst>
+            <pc:docMk/>
+            <pc:sldMk cId="849564699" sldId="265"/>
+            <ac:spMk id="8" creationId="{A2AD00B5-6B1C-35EF-91E5-A3A8537FFFB9}"/>
+          </ac:spMkLst>
+        </pc:spChg>
+        <pc:spChg chg="add mod">
+          <ac:chgData name="André Costa" userId="19fc697903e1aad7" providerId="LiveId" clId="{F9384AFB-4292-4E89-B21C-57023ED737FD}" dt="2023-05-19T19:41:16.351" v="2788"/>
+          <ac:spMkLst>
+            <pc:docMk/>
+            <pc:sldMk cId="849564699" sldId="265"/>
+            <ac:spMk id="9" creationId="{F5A44D98-2ED8-E44C-6B9E-1D99D66FD357}"/>
+          </ac:spMkLst>
+        </pc:spChg>
+        <pc:spChg chg="add mod">
+          <ac:chgData name="André Costa" userId="19fc697903e1aad7" providerId="LiveId" clId="{F9384AFB-4292-4E89-B21C-57023ED737FD}" dt="2023-05-19T19:41:16.351" v="2788"/>
+          <ac:spMkLst>
+            <pc:docMk/>
+            <pc:sldMk cId="849564699" sldId="265"/>
+            <ac:spMk id="10" creationId="{380CD40A-550D-0E04-8FED-BF36FE4C41CF}"/>
+          </ac:spMkLst>
+        </pc:spChg>
+        <pc:spChg chg="add mod">
+          <ac:chgData name="André Costa" userId="19fc697903e1aad7" providerId="LiveId" clId="{F9384AFB-4292-4E89-B21C-57023ED737FD}" dt="2023-05-19T19:41:16.351" v="2788"/>
+          <ac:spMkLst>
+            <pc:docMk/>
+            <pc:sldMk cId="849564699" sldId="265"/>
+            <ac:spMk id="11" creationId="{D9DE7E15-8918-0329-9428-5FD37C74AD1A}"/>
+          </ac:spMkLst>
+        </pc:spChg>
+        <pc:spChg chg="add mod">
+          <ac:chgData name="André Costa" userId="19fc697903e1aad7" providerId="LiveId" clId="{F9384AFB-4292-4E89-B21C-57023ED737FD}" dt="2023-05-19T19:41:16.351" v="2788"/>
+          <ac:spMkLst>
+            <pc:docMk/>
+            <pc:sldMk cId="849564699" sldId="265"/>
+            <ac:spMk id="12" creationId="{044C3C03-4504-53F8-E448-329C07C13F96}"/>
+          </ac:spMkLst>
+        </pc:spChg>
+        <pc:spChg chg="del">
+          <ac:chgData name="André Costa" userId="19fc697903e1aad7" providerId="LiveId" clId="{F9384AFB-4292-4E89-B21C-57023ED737FD}" dt="2023-05-19T19:41:01.473" v="2786" actId="478"/>
+          <ac:spMkLst>
+            <pc:docMk/>
+            <pc:sldMk cId="849564699" sldId="265"/>
+            <ac:spMk id="16" creationId="{E2CB179A-D512-7F06-5923-CC50915F3C3F}"/>
+          </ac:spMkLst>
+        </pc:spChg>
+        <pc:spChg chg="del">
+          <ac:chgData name="André Costa" userId="19fc697903e1aad7" providerId="LiveId" clId="{F9384AFB-4292-4E89-B21C-57023ED737FD}" dt="2023-05-19T19:40:55.359" v="2785" actId="478"/>
+          <ac:spMkLst>
+            <pc:docMk/>
+            <pc:sldMk cId="849564699" sldId="265"/>
+            <ac:spMk id="18" creationId="{BA82D5FB-11B7-A403-6412-D56257B8A670}"/>
+          </ac:spMkLst>
+        </pc:spChg>
+        <pc:spChg chg="del">
+          <ac:chgData name="André Costa" userId="19fc697903e1aad7" providerId="LiveId" clId="{F9384AFB-4292-4E89-B21C-57023ED737FD}" dt="2023-05-19T19:40:55.359" v="2785" actId="478"/>
+          <ac:spMkLst>
+            <pc:docMk/>
+            <pc:sldMk cId="849564699" sldId="265"/>
+            <ac:spMk id="19" creationId="{76B2C4E0-33F4-F62D-732F-35754112C420}"/>
+          </ac:spMkLst>
+        </pc:spChg>
+        <pc:picChg chg="del">
+          <ac:chgData name="André Costa" userId="19fc697903e1aad7" providerId="LiveId" clId="{F9384AFB-4292-4E89-B21C-57023ED737FD}" dt="2023-05-19T19:40:55.359" v="2785" actId="478"/>
+          <ac:picMkLst>
+            <pc:docMk/>
+            <pc:sldMk cId="849564699" sldId="265"/>
+            <ac:picMk id="5" creationId="{E4D46A7F-8879-B073-E3DC-955172E9FBA0}"/>
+          </ac:picMkLst>
+        </pc:picChg>
+        <pc:picChg chg="del">
+          <ac:chgData name="André Costa" userId="19fc697903e1aad7" providerId="LiveId" clId="{F9384AFB-4292-4E89-B21C-57023ED737FD}" dt="2023-05-19T19:41:01.473" v="2786" actId="478"/>
+          <ac:picMkLst>
+            <pc:docMk/>
+            <pc:sldMk cId="849564699" sldId="265"/>
+            <ac:picMk id="7" creationId="{D2CA0F5B-3ED2-D695-D3C2-4351EF786339}"/>
+          </ac:picMkLst>
+        </pc:picChg>
+        <pc:picChg chg="add mod">
+          <ac:chgData name="André Costa" userId="19fc697903e1aad7" providerId="LiveId" clId="{F9384AFB-4292-4E89-B21C-57023ED737FD}" dt="2023-05-19T19:41:16.351" v="2788"/>
+          <ac:picMkLst>
+            <pc:docMk/>
+            <pc:sldMk cId="849564699" sldId="265"/>
+            <ac:picMk id="13" creationId="{47C77187-3BFD-FD7A-879B-868592CC53A6}"/>
+          </ac:picMkLst>
+        </pc:picChg>
+        <pc:picChg chg="del">
+          <ac:chgData name="André Costa" userId="19fc697903e1aad7" providerId="LiveId" clId="{F9384AFB-4292-4E89-B21C-57023ED737FD}" dt="2023-05-19T19:40:55.359" v="2785" actId="478"/>
+          <ac:picMkLst>
+            <pc:docMk/>
+            <pc:sldMk cId="849564699" sldId="265"/>
+            <ac:picMk id="14" creationId="{226DE6D9-9F4E-E9ED-CEFF-A79F29633070}"/>
+          </ac:picMkLst>
+        </pc:picChg>
+        <pc:picChg chg="add mod">
+          <ac:chgData name="André Costa" userId="19fc697903e1aad7" providerId="LiveId" clId="{F9384AFB-4292-4E89-B21C-57023ED737FD}" dt="2023-05-19T19:41:16.351" v="2788"/>
+          <ac:picMkLst>
+            <pc:docMk/>
+            <pc:sldMk cId="849564699" sldId="265"/>
+            <ac:picMk id="15" creationId="{A759B368-C66B-D84F-3A22-6FFDD4892BE8}"/>
+          </ac:picMkLst>
+        </pc:picChg>
+        <pc:picChg chg="add mod">
+          <ac:chgData name="André Costa" userId="19fc697903e1aad7" providerId="LiveId" clId="{F9384AFB-4292-4E89-B21C-57023ED737FD}" dt="2023-05-19T19:41:16.351" v="2788"/>
+          <ac:picMkLst>
+            <pc:docMk/>
+            <pc:sldMk cId="849564699" sldId="265"/>
+            <ac:picMk id="17" creationId="{069420D5-FCD7-8EBD-A082-141DF8DB8EE0}"/>
+          </ac:picMkLst>
+        </pc:picChg>
+      </pc:sldChg>
+      <pc:sldChg chg="addSp delSp modSp add mod">
+        <pc:chgData name="André Costa" userId="19fc697903e1aad7" providerId="LiveId" clId="{F9384AFB-4292-4E89-B21C-57023ED737FD}" dt="2023-05-19T19:41:59.088" v="2794"/>
+        <pc:sldMkLst>
+          <pc:docMk/>
+          <pc:sldMk cId="850539854" sldId="266"/>
+        </pc:sldMkLst>
+        <pc:spChg chg="add del mod">
+          <ac:chgData name="André Costa" userId="19fc697903e1aad7" providerId="LiveId" clId="{F9384AFB-4292-4E89-B21C-57023ED737FD}" dt="2023-05-19T19:41:40.937" v="2793" actId="478"/>
+          <ac:spMkLst>
+            <pc:docMk/>
+            <pc:sldMk cId="850539854" sldId="266"/>
+            <ac:spMk id="3" creationId="{0D560D42-F6AE-1FE0-41B7-6E00D20A224F}"/>
+          </ac:spMkLst>
+        </pc:spChg>
+        <pc:spChg chg="add del mod">
+          <ac:chgData name="André Costa" userId="19fc697903e1aad7" providerId="LiveId" clId="{F9384AFB-4292-4E89-B21C-57023ED737FD}" dt="2023-05-19T19:41:38.982" v="2792" actId="478"/>
+          <ac:spMkLst>
+            <pc:docMk/>
+            <pc:sldMk cId="850539854" sldId="266"/>
+            <ac:spMk id="5" creationId="{5F4298B0-C5BE-2EB4-E288-EC5F9AD4A6FA}"/>
+          </ac:spMkLst>
+        </pc:spChg>
+        <pc:spChg chg="add mod">
+          <ac:chgData name="André Costa" userId="19fc697903e1aad7" providerId="LiveId" clId="{F9384AFB-4292-4E89-B21C-57023ED737FD}" dt="2023-05-19T19:41:59.088" v="2794"/>
+          <ac:spMkLst>
+            <pc:docMk/>
+            <pc:sldMk cId="850539854" sldId="266"/>
+            <ac:spMk id="6" creationId="{51E9024B-7D7E-5E63-9CF9-A35651639195}"/>
+          </ac:spMkLst>
+        </pc:spChg>
+        <pc:spChg chg="add mod">
+          <ac:chgData name="André Costa" userId="19fc697903e1aad7" providerId="LiveId" clId="{F9384AFB-4292-4E89-B21C-57023ED737FD}" dt="2023-05-19T19:41:59.088" v="2794"/>
+          <ac:spMkLst>
+            <pc:docMk/>
+            <pc:sldMk cId="850539854" sldId="266"/>
+            <ac:spMk id="7" creationId="{0CD32895-7AAE-EA66-7B5D-A46A031F6607}"/>
+          </ac:spMkLst>
+        </pc:spChg>
+        <pc:spChg chg="del">
+          <ac:chgData name="André Costa" userId="19fc697903e1aad7" providerId="LiveId" clId="{F9384AFB-4292-4E89-B21C-57023ED737FD}" dt="2023-05-19T19:41:36.384" v="2791" actId="478"/>
+          <ac:spMkLst>
+            <pc:docMk/>
+            <pc:sldMk cId="850539854" sldId="266"/>
+            <ac:spMk id="8" creationId="{A2AD00B5-6B1C-35EF-91E5-A3A8537FFFB9}"/>
+          </ac:spMkLst>
+        </pc:spChg>
+        <pc:spChg chg="del">
+          <ac:chgData name="André Costa" userId="19fc697903e1aad7" providerId="LiveId" clId="{F9384AFB-4292-4E89-B21C-57023ED737FD}" dt="2023-05-19T19:41:36.384" v="2791" actId="478"/>
+          <ac:spMkLst>
+            <pc:docMk/>
+            <pc:sldMk cId="850539854" sldId="266"/>
+            <ac:spMk id="9" creationId="{F5A44D98-2ED8-E44C-6B9E-1D99D66FD357}"/>
+          </ac:spMkLst>
+        </pc:spChg>
+        <pc:spChg chg="del">
+          <ac:chgData name="André Costa" userId="19fc697903e1aad7" providerId="LiveId" clId="{F9384AFB-4292-4E89-B21C-57023ED737FD}" dt="2023-05-19T19:41:36.384" v="2791" actId="478"/>
+          <ac:spMkLst>
+            <pc:docMk/>
+            <pc:sldMk cId="850539854" sldId="266"/>
+            <ac:spMk id="10" creationId="{380CD40A-550D-0E04-8FED-BF36FE4C41CF}"/>
+          </ac:spMkLst>
+        </pc:spChg>
+        <pc:spChg chg="del">
+          <ac:chgData name="André Costa" userId="19fc697903e1aad7" providerId="LiveId" clId="{F9384AFB-4292-4E89-B21C-57023ED737FD}" dt="2023-05-19T19:41:36.384" v="2791" actId="478"/>
+          <ac:spMkLst>
+            <pc:docMk/>
+            <pc:sldMk cId="850539854" sldId="266"/>
+            <ac:spMk id="11" creationId="{D9DE7E15-8918-0329-9428-5FD37C74AD1A}"/>
+          </ac:spMkLst>
+        </pc:spChg>
+        <pc:spChg chg="del">
+          <ac:chgData name="André Costa" userId="19fc697903e1aad7" providerId="LiveId" clId="{F9384AFB-4292-4E89-B21C-57023ED737FD}" dt="2023-05-19T19:41:36.384" v="2791" actId="478"/>
+          <ac:spMkLst>
+            <pc:docMk/>
+            <pc:sldMk cId="850539854" sldId="266"/>
+            <ac:spMk id="12" creationId="{044C3C03-4504-53F8-E448-329C07C13F96}"/>
+          </ac:spMkLst>
+        </pc:spChg>
+        <pc:spChg chg="add mod">
+          <ac:chgData name="André Costa" userId="19fc697903e1aad7" providerId="LiveId" clId="{F9384AFB-4292-4E89-B21C-57023ED737FD}" dt="2023-05-19T19:41:59.088" v="2794"/>
+          <ac:spMkLst>
+            <pc:docMk/>
+            <pc:sldMk cId="850539854" sldId="266"/>
+            <ac:spMk id="14" creationId="{D0D8EA1A-38B6-66E3-19A8-82B400493ADA}"/>
+          </ac:spMkLst>
+        </pc:spChg>
+        <pc:spChg chg="add mod">
+          <ac:chgData name="André Costa" userId="19fc697903e1aad7" providerId="LiveId" clId="{F9384AFB-4292-4E89-B21C-57023ED737FD}" dt="2023-05-19T19:41:59.088" v="2794"/>
+          <ac:spMkLst>
+            <pc:docMk/>
+            <pc:sldMk cId="850539854" sldId="266"/>
+            <ac:spMk id="16" creationId="{4E614254-65BA-CFCC-AE1C-8CF986885CB1}"/>
+          </ac:spMkLst>
+        </pc:spChg>
+        <pc:spChg chg="add mod">
+          <ac:chgData name="André Costa" userId="19fc697903e1aad7" providerId="LiveId" clId="{F9384AFB-4292-4E89-B21C-57023ED737FD}" dt="2023-05-19T19:41:59.088" v="2794"/>
+          <ac:spMkLst>
+            <pc:docMk/>
+            <pc:sldMk cId="850539854" sldId="266"/>
+            <ac:spMk id="18" creationId="{4D8A6476-B2B5-6880-DAB0-94892AE592ED}"/>
+          </ac:spMkLst>
+        </pc:spChg>
+        <pc:picChg chg="del">
+          <ac:chgData name="André Costa" userId="19fc697903e1aad7" providerId="LiveId" clId="{F9384AFB-4292-4E89-B21C-57023ED737FD}" dt="2023-05-19T19:41:36.384" v="2791" actId="478"/>
+          <ac:picMkLst>
+            <pc:docMk/>
+            <pc:sldMk cId="850539854" sldId="266"/>
+            <ac:picMk id="13" creationId="{47C77187-3BFD-FD7A-879B-868592CC53A6}"/>
+          </ac:picMkLst>
+        </pc:picChg>
+        <pc:picChg chg="del">
+          <ac:chgData name="André Costa" userId="19fc697903e1aad7" providerId="LiveId" clId="{F9384AFB-4292-4E89-B21C-57023ED737FD}" dt="2023-05-19T19:41:36.384" v="2791" actId="478"/>
+          <ac:picMkLst>
+            <pc:docMk/>
+            <pc:sldMk cId="850539854" sldId="266"/>
+            <ac:picMk id="15" creationId="{A759B368-C66B-D84F-3A22-6FFDD4892BE8}"/>
+          </ac:picMkLst>
+        </pc:picChg>
+        <pc:picChg chg="del">
+          <ac:chgData name="André Costa" userId="19fc697903e1aad7" providerId="LiveId" clId="{F9384AFB-4292-4E89-B21C-57023ED737FD}" dt="2023-05-19T19:41:36.384" v="2791" actId="478"/>
+          <ac:picMkLst>
+            <pc:docMk/>
+            <pc:sldMk cId="850539854" sldId="266"/>
+            <ac:picMk id="17" creationId="{069420D5-FCD7-8EBD-A082-141DF8DB8EE0}"/>
+          </ac:picMkLst>
+        </pc:picChg>
+        <pc:picChg chg="add mod">
+          <ac:chgData name="André Costa" userId="19fc697903e1aad7" providerId="LiveId" clId="{F9384AFB-4292-4E89-B21C-57023ED737FD}" dt="2023-05-19T19:41:59.088" v="2794"/>
+          <ac:picMkLst>
+            <pc:docMk/>
+            <pc:sldMk cId="850539854" sldId="266"/>
+            <ac:picMk id="19" creationId="{A23616A0-F960-904C-C2AD-A008E0CF75D4}"/>
+          </ac:picMkLst>
+        </pc:picChg>
+        <pc:picChg chg="add mod">
+          <ac:chgData name="André Costa" userId="19fc697903e1aad7" providerId="LiveId" clId="{F9384AFB-4292-4E89-B21C-57023ED737FD}" dt="2023-05-19T19:41:59.088" v="2794"/>
+          <ac:picMkLst>
+            <pc:docMk/>
+            <pc:sldMk cId="850539854" sldId="266"/>
+            <ac:picMk id="20" creationId="{279E07C0-8B09-BBA4-C1F4-EE2096230D31}"/>
+          </ac:picMkLst>
+        </pc:picChg>
+        <pc:picChg chg="add mod">
+          <ac:chgData name="André Costa" userId="19fc697903e1aad7" providerId="LiveId" clId="{F9384AFB-4292-4E89-B21C-57023ED737FD}" dt="2023-05-19T19:41:59.088" v="2794"/>
+          <ac:picMkLst>
+            <pc:docMk/>
+            <pc:sldMk cId="850539854" sldId="266"/>
+            <ac:picMk id="21" creationId="{CD669DAB-A049-5E6C-BCFA-59D9F426EB25}"/>
+          </ac:picMkLst>
+        </pc:picChg>
       </pc:sldChg>
     </pc:docChg>
   </pc:docChgLst>
@@ -6468,7 +6762,7 @@
           <a:lstStyle/>
           <a:p>
             <a:r>
-              <a:rPr lang="en-US" sz="2800"/>
+              <a:rPr lang="en-US" sz="2800" dirty="0"/>
               <a:t>  Algorithms Implemented and Theirs Best Results</a:t>
             </a:r>
           </a:p>
@@ -6915,6 +7209,14 @@
 <file path=ppt/slides/slide6.xml><?xml version="1.0" encoding="utf-8"?>
 <p:sld xmlns:a="http://schemas.openxmlformats.org/drawingml/2006/main" xmlns:r="http://schemas.openxmlformats.org/officeDocument/2006/relationships" xmlns:p="http://schemas.openxmlformats.org/presentationml/2006/main">
   <p:cSld>
+    <p:bg>
+      <p:bgPr>
+        <a:solidFill>
+          <a:schemeClr val="bg1"/>
+        </a:solidFill>
+        <a:effectLst/>
+      </p:bgPr>
+    </p:bg>
     <p:spTree>
       <p:nvGrpSpPr>
         <p:cNvPr id="1" name=""/>
@@ -6929,12 +7231,356 @@
           <a:chExt cx="0" cy="0"/>
         </a:xfrm>
       </p:grpSpPr>
+      <p:sp useBgFill="1">
+        <p:nvSpPr>
+          <p:cNvPr id="22" name="Rectangle 21">
+            <a:extLst>
+              <a:ext uri="{FF2B5EF4-FFF2-40B4-BE49-F238E27FC236}">
+                <a16:creationId xmlns:a16="http://schemas.microsoft.com/office/drawing/2014/main" id="{0550F5B9-399F-4FAD-AE6C-ED65F9A43A74}"/>
+              </a:ext>
+              <a:ext uri="{C183D7F6-B498-43B3-948B-1728B52AA6E4}">
+                <adec:decorative xmlns:adec="http://schemas.microsoft.com/office/drawing/2017/decorative" val="1"/>
+              </a:ext>
+            </a:extLst>
+          </p:cNvPr>
+          <p:cNvSpPr>
+            <a:spLocks noGrp="1" noRot="1" noChangeAspect="1" noMove="1" noResize="1" noEditPoints="1" noAdjustHandles="1" noChangeArrowheads="1" noChangeShapeType="1" noTextEdit="1"/>
+          </p:cNvSpPr>
+          <p:nvPr>
+            <p:extLst>
+              <p:ext uri="{386F3935-93C4-4BCD-93E2-E3B085C9AB24}">
+                <p16:designElem xmlns:p16="http://schemas.microsoft.com/office/powerpoint/2015/main" val="1"/>
+              </p:ext>
+            </p:extLst>
+          </p:nvPr>
+        </p:nvSpPr>
+        <p:spPr>
+          <a:xfrm>
+            <a:off x="0" y="0"/>
+            <a:ext cx="12192000" cy="6858000"/>
+          </a:xfrm>
+          <a:prstGeom prst="rect">
+            <a:avLst/>
+          </a:prstGeom>
+          <a:ln>
+            <a:noFill/>
+          </a:ln>
+        </p:spPr>
+        <p:style>
+          <a:lnRef idx="2">
+            <a:schemeClr val="accent1">
+              <a:shade val="50000"/>
+            </a:schemeClr>
+          </a:lnRef>
+          <a:fillRef idx="1">
+            <a:schemeClr val="accent1"/>
+          </a:fillRef>
+          <a:effectRef idx="0">
+            <a:schemeClr val="accent1"/>
+          </a:effectRef>
+          <a:fontRef idx="minor">
+            <a:schemeClr val="lt1"/>
+          </a:fontRef>
+        </p:style>
+        <p:txBody>
+          <a:bodyPr rtlCol="0" anchor="ctr"/>
+          <a:lstStyle/>
+          <a:p>
+            <a:pPr algn="ctr"/>
+            <a:endParaRPr lang="en-US"/>
+          </a:p>
+        </p:txBody>
+      </p:sp>
+      <p:sp useBgFill="1">
+        <p:nvSpPr>
+          <p:cNvPr id="24" name="Rectangle 23">
+            <a:extLst>
+              <a:ext uri="{FF2B5EF4-FFF2-40B4-BE49-F238E27FC236}">
+                <a16:creationId xmlns:a16="http://schemas.microsoft.com/office/drawing/2014/main" id="{C062E60F-5CD4-4268-8359-8076634680E5}"/>
+              </a:ext>
+              <a:ext uri="{C183D7F6-B498-43B3-948B-1728B52AA6E4}">
+                <adec:decorative xmlns:adec="http://schemas.microsoft.com/office/drawing/2017/decorative" val="1"/>
+              </a:ext>
+            </a:extLst>
+          </p:cNvPr>
+          <p:cNvSpPr>
+            <a:spLocks noGrp="1" noRot="1" noChangeAspect="1" noMove="1" noResize="1" noEditPoints="1" noAdjustHandles="1" noChangeArrowheads="1" noChangeShapeType="1" noTextEdit="1"/>
+          </p:cNvSpPr>
+          <p:nvPr>
+            <p:extLst>
+              <p:ext uri="{386F3935-93C4-4BCD-93E2-E3B085C9AB24}">
+                <p16:designElem xmlns:p16="http://schemas.microsoft.com/office/powerpoint/2015/main" val="1"/>
+              </p:ext>
+            </p:extLst>
+          </p:nvPr>
+        </p:nvSpPr>
+        <p:spPr>
+          <a:xfrm>
+            <a:off x="554416" y="288350"/>
+            <a:ext cx="11167447" cy="2089317"/>
+          </a:xfrm>
+          <a:prstGeom prst="rect">
+            <a:avLst/>
+          </a:prstGeom>
+          <a:ln w="12700">
+            <a:solidFill>
+              <a:srgbClr val="DEDEDE"/>
+            </a:solidFill>
+          </a:ln>
+          <a:effectLst>
+            <a:outerShdw blurRad="50800" dist="38100" dir="2700000" algn="tl" rotWithShape="0">
+              <a:schemeClr val="bg2">
+                <a:lumMod val="85000"/>
+                <a:alpha val="50000"/>
+              </a:schemeClr>
+            </a:outerShdw>
+          </a:effectLst>
+        </p:spPr>
+        <p:style>
+          <a:lnRef idx="2">
+            <a:schemeClr val="accent1">
+              <a:shade val="50000"/>
+            </a:schemeClr>
+          </a:lnRef>
+          <a:fillRef idx="1">
+            <a:schemeClr val="accent1"/>
+          </a:fillRef>
+          <a:effectRef idx="0">
+            <a:schemeClr val="accent1"/>
+          </a:effectRef>
+          <a:fontRef idx="minor">
+            <a:schemeClr val="lt1"/>
+          </a:fontRef>
+        </p:style>
+        <p:txBody>
+          <a:bodyPr rtlCol="0" anchor="ctr"/>
+          <a:lstStyle/>
+          <a:p>
+            <a:pPr marL="0" marR="0" lvl="0" indent="0" algn="ctr" defTabSz="914400" rtl="0" eaLnBrk="1" fontAlgn="auto" latinLnBrk="0" hangingPunct="1">
+              <a:lnSpc>
+                <a:spcPct val="100000"/>
+              </a:lnSpc>
+              <a:spcBef>
+                <a:spcPts val="0"/>
+              </a:spcBef>
+              <a:spcAft>
+                <a:spcPts val="0"/>
+              </a:spcAft>
+              <a:buClrTx/>
+              <a:buSzTx/>
+              <a:buFontTx/>
+              <a:buNone/>
+              <a:tabLst/>
+              <a:defRPr/>
+            </a:pPr>
+            <a:endParaRPr kumimoji="0" lang="en-US" sz="1800" b="0" i="0" u="none" strike="noStrike" kern="1200" cap="none" spc="0" normalizeH="0" baseline="0" noProof="0">
+              <a:ln>
+                <a:noFill/>
+              </a:ln>
+              <a:solidFill>
+                <a:prstClr val="white"/>
+              </a:solidFill>
+              <a:effectLst/>
+              <a:uLnTx/>
+              <a:uFillTx/>
+              <a:latin typeface="Calibri" panose="020F0502020204030204"/>
+              <a:ea typeface="+mn-ea"/>
+              <a:cs typeface="+mn-cs"/>
+            </a:endParaRPr>
+          </a:p>
+        </p:txBody>
+      </p:sp>
       <p:sp>
         <p:nvSpPr>
-          <p:cNvPr id="2" name="Title 1">
-            <a:extLst>
-              <a:ext uri="{FF2B5EF4-FFF2-40B4-BE49-F238E27FC236}">
-                <a16:creationId xmlns:a16="http://schemas.microsoft.com/office/drawing/2014/main" id="{A3E5AD32-2BF4-A76D-607F-3633BB430573}"/>
+          <p:cNvPr id="26" name="Rectangle 25">
+            <a:extLst>
+              <a:ext uri="{FF2B5EF4-FFF2-40B4-BE49-F238E27FC236}">
+                <a16:creationId xmlns:a16="http://schemas.microsoft.com/office/drawing/2014/main" id="{BB341EC3-1810-4D33-BA3F-E2D0AA0ECFB6}"/>
+              </a:ext>
+              <a:ext uri="{C183D7F6-B498-43B3-948B-1728B52AA6E4}">
+                <adec:decorative xmlns:adec="http://schemas.microsoft.com/office/drawing/2017/decorative" val="1"/>
+              </a:ext>
+            </a:extLst>
+          </p:cNvPr>
+          <p:cNvSpPr>
+            <a:spLocks noGrp="1" noRot="1" noChangeAspect="1" noMove="1" noResize="1" noEditPoints="1" noAdjustHandles="1" noChangeArrowheads="1" noChangeShapeType="1" noTextEdit="1"/>
+          </p:cNvSpPr>
+          <p:nvPr>
+            <p:extLst>
+              <p:ext uri="{386F3935-93C4-4BCD-93E2-E3B085C9AB24}">
+                <p16:designElem xmlns:p16="http://schemas.microsoft.com/office/powerpoint/2015/main" val="1"/>
+              </p:ext>
+            </p:extLst>
+          </p:nvPr>
+        </p:nvSpPr>
+        <p:spPr>
+          <a:xfrm>
+            <a:off x="490408" y="980964"/>
+            <a:ext cx="128016" cy="704088"/>
+          </a:xfrm>
+          <a:prstGeom prst="rect">
+            <a:avLst/>
+          </a:prstGeom>
+          <a:solidFill>
+            <a:schemeClr val="accent2"/>
+          </a:solidFill>
+          <a:ln>
+            <a:noFill/>
+          </a:ln>
+        </p:spPr>
+        <p:style>
+          <a:lnRef idx="2">
+            <a:schemeClr val="accent1">
+              <a:shade val="50000"/>
+            </a:schemeClr>
+          </a:lnRef>
+          <a:fillRef idx="1">
+            <a:schemeClr val="accent1"/>
+          </a:fillRef>
+          <a:effectRef idx="0">
+            <a:schemeClr val="accent1"/>
+          </a:effectRef>
+          <a:fontRef idx="minor">
+            <a:schemeClr val="lt1"/>
+          </a:fontRef>
+        </p:style>
+        <p:txBody>
+          <a:bodyPr rtlCol="0" anchor="ctr"/>
+          <a:lstStyle/>
+          <a:p>
+            <a:pPr marL="0" marR="0" lvl="0" indent="0" algn="ctr" defTabSz="914400" rtl="0" eaLnBrk="1" fontAlgn="auto" latinLnBrk="0" hangingPunct="1">
+              <a:lnSpc>
+                <a:spcPct val="100000"/>
+              </a:lnSpc>
+              <a:spcBef>
+                <a:spcPts val="0"/>
+              </a:spcBef>
+              <a:spcAft>
+                <a:spcPts val="0"/>
+              </a:spcAft>
+              <a:buClrTx/>
+              <a:buSzTx/>
+              <a:buFontTx/>
+              <a:buNone/>
+              <a:tabLst/>
+              <a:defRPr/>
+            </a:pPr>
+            <a:endParaRPr kumimoji="0" lang="en-US" sz="1800" b="0" i="0" u="none" strike="noStrike" kern="1200" cap="none" spc="0" normalizeH="0" baseline="0" noProof="0" dirty="0">
+              <a:ln>
+                <a:noFill/>
+              </a:ln>
+              <a:solidFill>
+                <a:prstClr val="white"/>
+              </a:solidFill>
+              <a:effectLst/>
+              <a:uLnTx/>
+              <a:uFillTx/>
+              <a:latin typeface="Calibri" panose="020F0502020204030204"/>
+              <a:ea typeface="+mn-ea"/>
+              <a:cs typeface="+mn-cs"/>
+            </a:endParaRPr>
+          </a:p>
+        </p:txBody>
+      </p:sp>
+      <p:sp>
+        <p:nvSpPr>
+          <p:cNvPr id="28" name="Rectangle 27">
+            <a:extLst>
+              <a:ext uri="{FF2B5EF4-FFF2-40B4-BE49-F238E27FC236}">
+                <a16:creationId xmlns:a16="http://schemas.microsoft.com/office/drawing/2014/main" id="{10127CDE-2B99-47A8-BB3C-7D17519105E0}"/>
+              </a:ext>
+              <a:ext uri="{C183D7F6-B498-43B3-948B-1728B52AA6E4}">
+                <adec:decorative xmlns:adec="http://schemas.microsoft.com/office/drawing/2017/decorative" val="1"/>
+              </a:ext>
+            </a:extLst>
+          </p:cNvPr>
+          <p:cNvSpPr>
+            <a:spLocks noGrp="1" noRot="1" noChangeAspect="1" noMove="1" noResize="1" noEditPoints="1" noAdjustHandles="1" noChangeArrowheads="1" noChangeShapeType="1" noTextEdit="1"/>
+          </p:cNvSpPr>
+          <p:nvPr>
+            <p:extLst>
+              <p:ext uri="{386F3935-93C4-4BCD-93E2-E3B085C9AB24}">
+                <p16:designElem xmlns:p16="http://schemas.microsoft.com/office/powerpoint/2015/main" val="1"/>
+              </p:ext>
+            </p:extLst>
+          </p:nvPr>
+        </p:nvSpPr>
+        <p:spPr>
+          <a:xfrm rot="5400000">
+            <a:off x="3610864" y="1323863"/>
+            <a:ext cx="1463040" cy="18288"/>
+          </a:xfrm>
+          <a:prstGeom prst="rect">
+            <a:avLst/>
+          </a:prstGeom>
+          <a:solidFill>
+            <a:srgbClr val="D5D5D5"/>
+          </a:solidFill>
+          <a:ln w="3175">
+            <a:noFill/>
+          </a:ln>
+          <a:effectLst/>
+        </p:spPr>
+        <p:style>
+          <a:lnRef idx="2">
+            <a:schemeClr val="accent1">
+              <a:shade val="50000"/>
+            </a:schemeClr>
+          </a:lnRef>
+          <a:fillRef idx="1">
+            <a:schemeClr val="accent1"/>
+          </a:fillRef>
+          <a:effectRef idx="0">
+            <a:schemeClr val="accent1"/>
+          </a:effectRef>
+          <a:fontRef idx="minor">
+            <a:schemeClr val="lt1"/>
+          </a:fontRef>
+        </p:style>
+        <p:txBody>
+          <a:bodyPr rtlCol="0" anchor="ctr"/>
+          <a:lstStyle/>
+          <a:p>
+            <a:pPr marL="0" marR="0" lvl="0" indent="0" algn="ctr" defTabSz="914400" rtl="0" eaLnBrk="1" fontAlgn="auto" latinLnBrk="0" hangingPunct="1">
+              <a:lnSpc>
+                <a:spcPct val="100000"/>
+              </a:lnSpc>
+              <a:spcBef>
+                <a:spcPts val="0"/>
+              </a:spcBef>
+              <a:spcAft>
+                <a:spcPts val="0"/>
+              </a:spcAft>
+              <a:buClrTx/>
+              <a:buSzTx/>
+              <a:buFontTx/>
+              <a:buNone/>
+              <a:tabLst/>
+              <a:defRPr/>
+            </a:pPr>
+            <a:endParaRPr kumimoji="0" lang="en-US" sz="1800" b="0" i="0" u="none" strike="noStrike" kern="1200" cap="none" spc="0" normalizeH="0" baseline="0" noProof="0">
+              <a:ln>
+                <a:noFill/>
+              </a:ln>
+              <a:solidFill>
+                <a:prstClr val="white"/>
+              </a:solidFill>
+              <a:effectLst/>
+              <a:uLnTx/>
+              <a:uFillTx/>
+              <a:latin typeface="Calibri" panose="020F0502020204030204"/>
+              <a:ea typeface="+mn-ea"/>
+              <a:cs typeface="+mn-cs"/>
+            </a:endParaRPr>
+          </a:p>
+        </p:txBody>
+      </p:sp>
+      <p:sp>
+        <p:nvSpPr>
+          <p:cNvPr id="8" name="Title 1">
+            <a:extLst>
+              <a:ext uri="{FF2B5EF4-FFF2-40B4-BE49-F238E27FC236}">
+                <a16:creationId xmlns:a16="http://schemas.microsoft.com/office/drawing/2014/main" id="{A2AD00B5-6B1C-35EF-91E5-A3A8537FFFB9}"/>
               </a:ext>
             </a:extLst>
           </p:cNvPr>
@@ -6980,10 +7626,10 @@
       </p:sp>
       <p:sp>
         <p:nvSpPr>
-          <p:cNvPr id="3" name="Content Placeholder 2">
-            <a:extLst>
-              <a:ext uri="{FF2B5EF4-FFF2-40B4-BE49-F238E27FC236}">
-                <a16:creationId xmlns:a16="http://schemas.microsoft.com/office/drawing/2014/main" id="{C9FF7FA9-CD0D-E0F8-F302-B0E747AF24A9}"/>
+          <p:cNvPr id="9" name="Content Placeholder 2">
+            <a:extLst>
+              <a:ext uri="{FF2B5EF4-FFF2-40B4-BE49-F238E27FC236}">
+                <a16:creationId xmlns:a16="http://schemas.microsoft.com/office/drawing/2014/main" id="{F5A44D98-2ED8-E44C-6B9E-1D99D66FD357}"/>
               </a:ext>
             </a:extLst>
           </p:cNvPr>
@@ -7025,10 +7671,10 @@
       </p:sp>
       <p:sp>
         <p:nvSpPr>
-          <p:cNvPr id="16" name="TextBox 15">
-            <a:extLst>
-              <a:ext uri="{FF2B5EF4-FFF2-40B4-BE49-F238E27FC236}">
-                <a16:creationId xmlns:a16="http://schemas.microsoft.com/office/drawing/2014/main" id="{E2CB179A-D512-7F06-5923-CC50915F3C3F}"/>
+          <p:cNvPr id="10" name="TextBox 9">
+            <a:extLst>
+              <a:ext uri="{FF2B5EF4-FFF2-40B4-BE49-F238E27FC236}">
+                <a16:creationId xmlns:a16="http://schemas.microsoft.com/office/drawing/2014/main" id="{380CD40A-550D-0E04-8FED-BF36FE4C41CF}"/>
               </a:ext>
             </a:extLst>
           </p:cNvPr>
@@ -7060,10 +7706,10 @@
       </p:sp>
       <p:sp>
         <p:nvSpPr>
-          <p:cNvPr id="18" name="TextBox 17">
-            <a:extLst>
-              <a:ext uri="{FF2B5EF4-FFF2-40B4-BE49-F238E27FC236}">
-                <a16:creationId xmlns:a16="http://schemas.microsoft.com/office/drawing/2014/main" id="{BA82D5FB-11B7-A403-6412-D56257B8A670}"/>
+          <p:cNvPr id="11" name="TextBox 10">
+            <a:extLst>
+              <a:ext uri="{FF2B5EF4-FFF2-40B4-BE49-F238E27FC236}">
+                <a16:creationId xmlns:a16="http://schemas.microsoft.com/office/drawing/2014/main" id="{D9DE7E15-8918-0329-9428-5FD37C74AD1A}"/>
               </a:ext>
             </a:extLst>
           </p:cNvPr>
@@ -7095,10 +7741,10 @@
       </p:sp>
       <p:sp>
         <p:nvSpPr>
-          <p:cNvPr id="19" name="TextBox 18">
-            <a:extLst>
-              <a:ext uri="{FF2B5EF4-FFF2-40B4-BE49-F238E27FC236}">
-                <a16:creationId xmlns:a16="http://schemas.microsoft.com/office/drawing/2014/main" id="{76B2C4E0-33F4-F62D-732F-35754112C420}"/>
+          <p:cNvPr id="12" name="TextBox 11">
+            <a:extLst>
+              <a:ext uri="{FF2B5EF4-FFF2-40B4-BE49-F238E27FC236}">
+                <a16:creationId xmlns:a16="http://schemas.microsoft.com/office/drawing/2014/main" id="{044C3C03-4504-53F8-E448-329C07C13F96}"/>
               </a:ext>
             </a:extLst>
           </p:cNvPr>
@@ -7130,10 +7776,10 @@
       </p:sp>
       <p:pic>
         <p:nvPicPr>
-          <p:cNvPr id="6" name="Picture 5">
-            <a:extLst>
-              <a:ext uri="{FF2B5EF4-FFF2-40B4-BE49-F238E27FC236}">
-                <a16:creationId xmlns:a16="http://schemas.microsoft.com/office/drawing/2014/main" id="{D32FEC26-59E8-875B-6FC8-DAC68B3F1EA9}"/>
+          <p:cNvPr id="13" name="Picture 12">
+            <a:extLst>
+              <a:ext uri="{FF2B5EF4-FFF2-40B4-BE49-F238E27FC236}">
+                <a16:creationId xmlns:a16="http://schemas.microsoft.com/office/drawing/2014/main" id="{47C77187-3BFD-FD7A-879B-868592CC53A6}"/>
               </a:ext>
             </a:extLst>
           </p:cNvPr>
@@ -7160,10 +7806,10 @@
       </p:pic>
       <p:pic>
         <p:nvPicPr>
-          <p:cNvPr id="9" name="Picture 8">
-            <a:extLst>
-              <a:ext uri="{FF2B5EF4-FFF2-40B4-BE49-F238E27FC236}">
-                <a16:creationId xmlns:a16="http://schemas.microsoft.com/office/drawing/2014/main" id="{A0D0DC3C-ED36-6404-37D8-5F6A6C840D8D}"/>
+          <p:cNvPr id="15" name="Picture 14">
+            <a:extLst>
+              <a:ext uri="{FF2B5EF4-FFF2-40B4-BE49-F238E27FC236}">
+                <a16:creationId xmlns:a16="http://schemas.microsoft.com/office/drawing/2014/main" id="{A759B368-C66B-D84F-3A22-6FFDD4892BE8}"/>
               </a:ext>
             </a:extLst>
           </p:cNvPr>
@@ -7190,10 +7836,10 @@
       </p:pic>
       <p:pic>
         <p:nvPicPr>
-          <p:cNvPr id="11" name="Picture 10">
-            <a:extLst>
-              <a:ext uri="{FF2B5EF4-FFF2-40B4-BE49-F238E27FC236}">
-                <a16:creationId xmlns:a16="http://schemas.microsoft.com/office/drawing/2014/main" id="{EE372298-34F8-FD85-054E-A943F47A3BFD}"/>
+          <p:cNvPr id="17" name="Picture 16">
+            <a:extLst>
+              <a:ext uri="{FF2B5EF4-FFF2-40B4-BE49-F238E27FC236}">
+                <a16:creationId xmlns:a16="http://schemas.microsoft.com/office/drawing/2014/main" id="{069420D5-FCD7-8EBD-A082-141DF8DB8EE0}"/>
               </a:ext>
             </a:extLst>
           </p:cNvPr>
@@ -7221,7 +7867,7 @@
     </p:spTree>
     <p:extLst>
       <p:ext uri="{BB962C8B-B14F-4D97-AF65-F5344CB8AC3E}">
-        <p14:creationId xmlns:p14="http://schemas.microsoft.com/office/powerpoint/2010/main" val="3295622502"/>
+        <p14:creationId xmlns:p14="http://schemas.microsoft.com/office/powerpoint/2010/main" val="849564699"/>
       </p:ext>
     </p:extLst>
   </p:cSld>
@@ -7234,6 +7880,14 @@
 <file path=ppt/slides/slide7.xml><?xml version="1.0" encoding="utf-8"?>
 <p:sld xmlns:a="http://schemas.openxmlformats.org/drawingml/2006/main" xmlns:r="http://schemas.openxmlformats.org/officeDocument/2006/relationships" xmlns:p="http://schemas.openxmlformats.org/presentationml/2006/main">
   <p:cSld>
+    <p:bg>
+      <p:bgPr>
+        <a:solidFill>
+          <a:schemeClr val="bg1"/>
+        </a:solidFill>
+        <a:effectLst/>
+      </p:bgPr>
+    </p:bg>
     <p:spTree>
       <p:nvGrpSpPr>
         <p:cNvPr id="1" name=""/>
@@ -7248,12 +7902,356 @@
           <a:chExt cx="0" cy="0"/>
         </a:xfrm>
       </p:grpSpPr>
+      <p:sp useBgFill="1">
+        <p:nvSpPr>
+          <p:cNvPr id="22" name="Rectangle 21">
+            <a:extLst>
+              <a:ext uri="{FF2B5EF4-FFF2-40B4-BE49-F238E27FC236}">
+                <a16:creationId xmlns:a16="http://schemas.microsoft.com/office/drawing/2014/main" id="{0550F5B9-399F-4FAD-AE6C-ED65F9A43A74}"/>
+              </a:ext>
+              <a:ext uri="{C183D7F6-B498-43B3-948B-1728B52AA6E4}">
+                <adec:decorative xmlns:adec="http://schemas.microsoft.com/office/drawing/2017/decorative" val="1"/>
+              </a:ext>
+            </a:extLst>
+          </p:cNvPr>
+          <p:cNvSpPr>
+            <a:spLocks noGrp="1" noRot="1" noChangeAspect="1" noMove="1" noResize="1" noEditPoints="1" noAdjustHandles="1" noChangeArrowheads="1" noChangeShapeType="1" noTextEdit="1"/>
+          </p:cNvSpPr>
+          <p:nvPr>
+            <p:extLst>
+              <p:ext uri="{386F3935-93C4-4BCD-93E2-E3B085C9AB24}">
+                <p16:designElem xmlns:p16="http://schemas.microsoft.com/office/powerpoint/2015/main" val="1"/>
+              </p:ext>
+            </p:extLst>
+          </p:nvPr>
+        </p:nvSpPr>
+        <p:spPr>
+          <a:xfrm>
+            <a:off x="0" y="0"/>
+            <a:ext cx="12192000" cy="6858000"/>
+          </a:xfrm>
+          <a:prstGeom prst="rect">
+            <a:avLst/>
+          </a:prstGeom>
+          <a:ln>
+            <a:noFill/>
+          </a:ln>
+        </p:spPr>
+        <p:style>
+          <a:lnRef idx="2">
+            <a:schemeClr val="accent1">
+              <a:shade val="50000"/>
+            </a:schemeClr>
+          </a:lnRef>
+          <a:fillRef idx="1">
+            <a:schemeClr val="accent1"/>
+          </a:fillRef>
+          <a:effectRef idx="0">
+            <a:schemeClr val="accent1"/>
+          </a:effectRef>
+          <a:fontRef idx="minor">
+            <a:schemeClr val="lt1"/>
+          </a:fontRef>
+        </p:style>
+        <p:txBody>
+          <a:bodyPr rtlCol="0" anchor="ctr"/>
+          <a:lstStyle/>
+          <a:p>
+            <a:pPr algn="ctr"/>
+            <a:endParaRPr lang="en-US"/>
+          </a:p>
+        </p:txBody>
+      </p:sp>
+      <p:sp useBgFill="1">
+        <p:nvSpPr>
+          <p:cNvPr id="24" name="Rectangle 23">
+            <a:extLst>
+              <a:ext uri="{FF2B5EF4-FFF2-40B4-BE49-F238E27FC236}">
+                <a16:creationId xmlns:a16="http://schemas.microsoft.com/office/drawing/2014/main" id="{C062E60F-5CD4-4268-8359-8076634680E5}"/>
+              </a:ext>
+              <a:ext uri="{C183D7F6-B498-43B3-948B-1728B52AA6E4}">
+                <adec:decorative xmlns:adec="http://schemas.microsoft.com/office/drawing/2017/decorative" val="1"/>
+              </a:ext>
+            </a:extLst>
+          </p:cNvPr>
+          <p:cNvSpPr>
+            <a:spLocks noGrp="1" noRot="1" noChangeAspect="1" noMove="1" noResize="1" noEditPoints="1" noAdjustHandles="1" noChangeArrowheads="1" noChangeShapeType="1" noTextEdit="1"/>
+          </p:cNvSpPr>
+          <p:nvPr>
+            <p:extLst>
+              <p:ext uri="{386F3935-93C4-4BCD-93E2-E3B085C9AB24}">
+                <p16:designElem xmlns:p16="http://schemas.microsoft.com/office/powerpoint/2015/main" val="1"/>
+              </p:ext>
+            </p:extLst>
+          </p:nvPr>
+        </p:nvSpPr>
+        <p:spPr>
+          <a:xfrm>
+            <a:off x="554416" y="288350"/>
+            <a:ext cx="11167447" cy="2089317"/>
+          </a:xfrm>
+          <a:prstGeom prst="rect">
+            <a:avLst/>
+          </a:prstGeom>
+          <a:ln w="12700">
+            <a:solidFill>
+              <a:srgbClr val="DEDEDE"/>
+            </a:solidFill>
+          </a:ln>
+          <a:effectLst>
+            <a:outerShdw blurRad="50800" dist="38100" dir="2700000" algn="tl" rotWithShape="0">
+              <a:schemeClr val="bg2">
+                <a:lumMod val="85000"/>
+                <a:alpha val="50000"/>
+              </a:schemeClr>
+            </a:outerShdw>
+          </a:effectLst>
+        </p:spPr>
+        <p:style>
+          <a:lnRef idx="2">
+            <a:schemeClr val="accent1">
+              <a:shade val="50000"/>
+            </a:schemeClr>
+          </a:lnRef>
+          <a:fillRef idx="1">
+            <a:schemeClr val="accent1"/>
+          </a:fillRef>
+          <a:effectRef idx="0">
+            <a:schemeClr val="accent1"/>
+          </a:effectRef>
+          <a:fontRef idx="minor">
+            <a:schemeClr val="lt1"/>
+          </a:fontRef>
+        </p:style>
+        <p:txBody>
+          <a:bodyPr rtlCol="0" anchor="ctr"/>
+          <a:lstStyle/>
+          <a:p>
+            <a:pPr marL="0" marR="0" lvl="0" indent="0" algn="ctr" defTabSz="914400" rtl="0" eaLnBrk="1" fontAlgn="auto" latinLnBrk="0" hangingPunct="1">
+              <a:lnSpc>
+                <a:spcPct val="100000"/>
+              </a:lnSpc>
+              <a:spcBef>
+                <a:spcPts val="0"/>
+              </a:spcBef>
+              <a:spcAft>
+                <a:spcPts val="0"/>
+              </a:spcAft>
+              <a:buClrTx/>
+              <a:buSzTx/>
+              <a:buFontTx/>
+              <a:buNone/>
+              <a:tabLst/>
+              <a:defRPr/>
+            </a:pPr>
+            <a:endParaRPr kumimoji="0" lang="en-US" sz="1800" b="0" i="0" u="none" strike="noStrike" kern="1200" cap="none" spc="0" normalizeH="0" baseline="0" noProof="0">
+              <a:ln>
+                <a:noFill/>
+              </a:ln>
+              <a:solidFill>
+                <a:prstClr val="white"/>
+              </a:solidFill>
+              <a:effectLst/>
+              <a:uLnTx/>
+              <a:uFillTx/>
+              <a:latin typeface="Calibri" panose="020F0502020204030204"/>
+              <a:ea typeface="+mn-ea"/>
+              <a:cs typeface="+mn-cs"/>
+            </a:endParaRPr>
+          </a:p>
+        </p:txBody>
+      </p:sp>
       <p:sp>
         <p:nvSpPr>
-          <p:cNvPr id="2" name="Title 1">
-            <a:extLst>
-              <a:ext uri="{FF2B5EF4-FFF2-40B4-BE49-F238E27FC236}">
-                <a16:creationId xmlns:a16="http://schemas.microsoft.com/office/drawing/2014/main" id="{A3E5AD32-2BF4-A76D-607F-3633BB430573}"/>
+          <p:cNvPr id="26" name="Rectangle 25">
+            <a:extLst>
+              <a:ext uri="{FF2B5EF4-FFF2-40B4-BE49-F238E27FC236}">
+                <a16:creationId xmlns:a16="http://schemas.microsoft.com/office/drawing/2014/main" id="{BB341EC3-1810-4D33-BA3F-E2D0AA0ECFB6}"/>
+              </a:ext>
+              <a:ext uri="{C183D7F6-B498-43B3-948B-1728B52AA6E4}">
+                <adec:decorative xmlns:adec="http://schemas.microsoft.com/office/drawing/2017/decorative" val="1"/>
+              </a:ext>
+            </a:extLst>
+          </p:cNvPr>
+          <p:cNvSpPr>
+            <a:spLocks noGrp="1" noRot="1" noChangeAspect="1" noMove="1" noResize="1" noEditPoints="1" noAdjustHandles="1" noChangeArrowheads="1" noChangeShapeType="1" noTextEdit="1"/>
+          </p:cNvSpPr>
+          <p:nvPr>
+            <p:extLst>
+              <p:ext uri="{386F3935-93C4-4BCD-93E2-E3B085C9AB24}">
+                <p16:designElem xmlns:p16="http://schemas.microsoft.com/office/powerpoint/2015/main" val="1"/>
+              </p:ext>
+            </p:extLst>
+          </p:nvPr>
+        </p:nvSpPr>
+        <p:spPr>
+          <a:xfrm>
+            <a:off x="490408" y="980964"/>
+            <a:ext cx="128016" cy="704088"/>
+          </a:xfrm>
+          <a:prstGeom prst="rect">
+            <a:avLst/>
+          </a:prstGeom>
+          <a:solidFill>
+            <a:schemeClr val="accent2"/>
+          </a:solidFill>
+          <a:ln>
+            <a:noFill/>
+          </a:ln>
+        </p:spPr>
+        <p:style>
+          <a:lnRef idx="2">
+            <a:schemeClr val="accent1">
+              <a:shade val="50000"/>
+            </a:schemeClr>
+          </a:lnRef>
+          <a:fillRef idx="1">
+            <a:schemeClr val="accent1"/>
+          </a:fillRef>
+          <a:effectRef idx="0">
+            <a:schemeClr val="accent1"/>
+          </a:effectRef>
+          <a:fontRef idx="minor">
+            <a:schemeClr val="lt1"/>
+          </a:fontRef>
+        </p:style>
+        <p:txBody>
+          <a:bodyPr rtlCol="0" anchor="ctr"/>
+          <a:lstStyle/>
+          <a:p>
+            <a:pPr marL="0" marR="0" lvl="0" indent="0" algn="ctr" defTabSz="914400" rtl="0" eaLnBrk="1" fontAlgn="auto" latinLnBrk="0" hangingPunct="1">
+              <a:lnSpc>
+                <a:spcPct val="100000"/>
+              </a:lnSpc>
+              <a:spcBef>
+                <a:spcPts val="0"/>
+              </a:spcBef>
+              <a:spcAft>
+                <a:spcPts val="0"/>
+              </a:spcAft>
+              <a:buClrTx/>
+              <a:buSzTx/>
+              <a:buFontTx/>
+              <a:buNone/>
+              <a:tabLst/>
+              <a:defRPr/>
+            </a:pPr>
+            <a:endParaRPr kumimoji="0" lang="en-US" sz="1800" b="0" i="0" u="none" strike="noStrike" kern="1200" cap="none" spc="0" normalizeH="0" baseline="0" noProof="0" dirty="0">
+              <a:ln>
+                <a:noFill/>
+              </a:ln>
+              <a:solidFill>
+                <a:prstClr val="white"/>
+              </a:solidFill>
+              <a:effectLst/>
+              <a:uLnTx/>
+              <a:uFillTx/>
+              <a:latin typeface="Calibri" panose="020F0502020204030204"/>
+              <a:ea typeface="+mn-ea"/>
+              <a:cs typeface="+mn-cs"/>
+            </a:endParaRPr>
+          </a:p>
+        </p:txBody>
+      </p:sp>
+      <p:sp>
+        <p:nvSpPr>
+          <p:cNvPr id="28" name="Rectangle 27">
+            <a:extLst>
+              <a:ext uri="{FF2B5EF4-FFF2-40B4-BE49-F238E27FC236}">
+                <a16:creationId xmlns:a16="http://schemas.microsoft.com/office/drawing/2014/main" id="{10127CDE-2B99-47A8-BB3C-7D17519105E0}"/>
+              </a:ext>
+              <a:ext uri="{C183D7F6-B498-43B3-948B-1728B52AA6E4}">
+                <adec:decorative xmlns:adec="http://schemas.microsoft.com/office/drawing/2017/decorative" val="1"/>
+              </a:ext>
+            </a:extLst>
+          </p:cNvPr>
+          <p:cNvSpPr>
+            <a:spLocks noGrp="1" noRot="1" noChangeAspect="1" noMove="1" noResize="1" noEditPoints="1" noAdjustHandles="1" noChangeArrowheads="1" noChangeShapeType="1" noTextEdit="1"/>
+          </p:cNvSpPr>
+          <p:nvPr>
+            <p:extLst>
+              <p:ext uri="{386F3935-93C4-4BCD-93E2-E3B085C9AB24}">
+                <p16:designElem xmlns:p16="http://schemas.microsoft.com/office/powerpoint/2015/main" val="1"/>
+              </p:ext>
+            </p:extLst>
+          </p:nvPr>
+        </p:nvSpPr>
+        <p:spPr>
+          <a:xfrm rot="5400000">
+            <a:off x="3610864" y="1323863"/>
+            <a:ext cx="1463040" cy="18288"/>
+          </a:xfrm>
+          <a:prstGeom prst="rect">
+            <a:avLst/>
+          </a:prstGeom>
+          <a:solidFill>
+            <a:srgbClr val="D5D5D5"/>
+          </a:solidFill>
+          <a:ln w="3175">
+            <a:noFill/>
+          </a:ln>
+          <a:effectLst/>
+        </p:spPr>
+        <p:style>
+          <a:lnRef idx="2">
+            <a:schemeClr val="accent1">
+              <a:shade val="50000"/>
+            </a:schemeClr>
+          </a:lnRef>
+          <a:fillRef idx="1">
+            <a:schemeClr val="accent1"/>
+          </a:fillRef>
+          <a:effectRef idx="0">
+            <a:schemeClr val="accent1"/>
+          </a:effectRef>
+          <a:fontRef idx="minor">
+            <a:schemeClr val="lt1"/>
+          </a:fontRef>
+        </p:style>
+        <p:txBody>
+          <a:bodyPr rtlCol="0" anchor="ctr"/>
+          <a:lstStyle/>
+          <a:p>
+            <a:pPr marL="0" marR="0" lvl="0" indent="0" algn="ctr" defTabSz="914400" rtl="0" eaLnBrk="1" fontAlgn="auto" latinLnBrk="0" hangingPunct="1">
+              <a:lnSpc>
+                <a:spcPct val="100000"/>
+              </a:lnSpc>
+              <a:spcBef>
+                <a:spcPts val="0"/>
+              </a:spcBef>
+              <a:spcAft>
+                <a:spcPts val="0"/>
+              </a:spcAft>
+              <a:buClrTx/>
+              <a:buSzTx/>
+              <a:buFontTx/>
+              <a:buNone/>
+              <a:tabLst/>
+              <a:defRPr/>
+            </a:pPr>
+            <a:endParaRPr kumimoji="0" lang="en-US" sz="1800" b="0" i="0" u="none" strike="noStrike" kern="1200" cap="none" spc="0" normalizeH="0" baseline="0" noProof="0">
+              <a:ln>
+                <a:noFill/>
+              </a:ln>
+              <a:solidFill>
+                <a:prstClr val="white"/>
+              </a:solidFill>
+              <a:effectLst/>
+              <a:uLnTx/>
+              <a:uFillTx/>
+              <a:latin typeface="Calibri" panose="020F0502020204030204"/>
+              <a:ea typeface="+mn-ea"/>
+              <a:cs typeface="+mn-cs"/>
+            </a:endParaRPr>
+          </a:p>
+        </p:txBody>
+      </p:sp>
+      <p:sp>
+        <p:nvSpPr>
+          <p:cNvPr id="6" name="Title 1">
+            <a:extLst>
+              <a:ext uri="{FF2B5EF4-FFF2-40B4-BE49-F238E27FC236}">
+                <a16:creationId xmlns:a16="http://schemas.microsoft.com/office/drawing/2014/main" id="{51E9024B-7D7E-5E63-9CF9-A35651639195}"/>
               </a:ext>
             </a:extLst>
           </p:cNvPr>
@@ -7299,10 +8297,10 @@
       </p:sp>
       <p:sp>
         <p:nvSpPr>
-          <p:cNvPr id="3" name="Content Placeholder 2">
-            <a:extLst>
-              <a:ext uri="{FF2B5EF4-FFF2-40B4-BE49-F238E27FC236}">
-                <a16:creationId xmlns:a16="http://schemas.microsoft.com/office/drawing/2014/main" id="{C9FF7FA9-CD0D-E0F8-F302-B0E747AF24A9}"/>
+          <p:cNvPr id="7" name="Content Placeholder 2">
+            <a:extLst>
+              <a:ext uri="{FF2B5EF4-FFF2-40B4-BE49-F238E27FC236}">
+                <a16:creationId xmlns:a16="http://schemas.microsoft.com/office/drawing/2014/main" id="{0CD32895-7AAE-EA66-7B5D-A46A031F6607}"/>
               </a:ext>
             </a:extLst>
           </p:cNvPr>
@@ -7344,10 +8342,10 @@
       </p:sp>
       <p:sp>
         <p:nvSpPr>
-          <p:cNvPr id="16" name="TextBox 15">
-            <a:extLst>
-              <a:ext uri="{FF2B5EF4-FFF2-40B4-BE49-F238E27FC236}">
-                <a16:creationId xmlns:a16="http://schemas.microsoft.com/office/drawing/2014/main" id="{E2CB179A-D512-7F06-5923-CC50915F3C3F}"/>
+          <p:cNvPr id="14" name="TextBox 13">
+            <a:extLst>
+              <a:ext uri="{FF2B5EF4-FFF2-40B4-BE49-F238E27FC236}">
+                <a16:creationId xmlns:a16="http://schemas.microsoft.com/office/drawing/2014/main" id="{D0D8EA1A-38B6-66E3-19A8-82B400493ADA}"/>
               </a:ext>
             </a:extLst>
           </p:cNvPr>
@@ -7379,10 +8377,10 @@
       </p:sp>
       <p:sp>
         <p:nvSpPr>
-          <p:cNvPr id="18" name="TextBox 17">
-            <a:extLst>
-              <a:ext uri="{FF2B5EF4-FFF2-40B4-BE49-F238E27FC236}">
-                <a16:creationId xmlns:a16="http://schemas.microsoft.com/office/drawing/2014/main" id="{BA82D5FB-11B7-A403-6412-D56257B8A670}"/>
+          <p:cNvPr id="16" name="TextBox 15">
+            <a:extLst>
+              <a:ext uri="{FF2B5EF4-FFF2-40B4-BE49-F238E27FC236}">
+                <a16:creationId xmlns:a16="http://schemas.microsoft.com/office/drawing/2014/main" id="{4E614254-65BA-CFCC-AE1C-8CF986885CB1}"/>
               </a:ext>
             </a:extLst>
           </p:cNvPr>
@@ -7414,10 +8412,10 @@
       </p:sp>
       <p:sp>
         <p:nvSpPr>
-          <p:cNvPr id="19" name="TextBox 18">
-            <a:extLst>
-              <a:ext uri="{FF2B5EF4-FFF2-40B4-BE49-F238E27FC236}">
-                <a16:creationId xmlns:a16="http://schemas.microsoft.com/office/drawing/2014/main" id="{76B2C4E0-33F4-F62D-732F-35754112C420}"/>
+          <p:cNvPr id="18" name="TextBox 17">
+            <a:extLst>
+              <a:ext uri="{FF2B5EF4-FFF2-40B4-BE49-F238E27FC236}">
+                <a16:creationId xmlns:a16="http://schemas.microsoft.com/office/drawing/2014/main" id="{4D8A6476-B2B5-6880-DAB0-94892AE592ED}"/>
               </a:ext>
             </a:extLst>
           </p:cNvPr>
@@ -7449,10 +8447,10 @@
       </p:sp>
       <p:pic>
         <p:nvPicPr>
-          <p:cNvPr id="6" name="Picture 5">
-            <a:extLst>
-              <a:ext uri="{FF2B5EF4-FFF2-40B4-BE49-F238E27FC236}">
-                <a16:creationId xmlns:a16="http://schemas.microsoft.com/office/drawing/2014/main" id="{E88AB5DA-E5F5-80B8-56B2-B1723D037F71}"/>
+          <p:cNvPr id="19" name="Picture 18">
+            <a:extLst>
+              <a:ext uri="{FF2B5EF4-FFF2-40B4-BE49-F238E27FC236}">
+                <a16:creationId xmlns:a16="http://schemas.microsoft.com/office/drawing/2014/main" id="{A23616A0-F960-904C-C2AD-A008E0CF75D4}"/>
               </a:ext>
             </a:extLst>
           </p:cNvPr>
@@ -7479,10 +8477,10 @@
       </p:pic>
       <p:pic>
         <p:nvPicPr>
-          <p:cNvPr id="9" name="Picture 8">
-            <a:extLst>
-              <a:ext uri="{FF2B5EF4-FFF2-40B4-BE49-F238E27FC236}">
-                <a16:creationId xmlns:a16="http://schemas.microsoft.com/office/drawing/2014/main" id="{49FD35D5-F24F-3552-87F7-9F5189A50C7A}"/>
+          <p:cNvPr id="20" name="Picture 19">
+            <a:extLst>
+              <a:ext uri="{FF2B5EF4-FFF2-40B4-BE49-F238E27FC236}">
+                <a16:creationId xmlns:a16="http://schemas.microsoft.com/office/drawing/2014/main" id="{279E07C0-8B09-BBA4-C1F4-EE2096230D31}"/>
               </a:ext>
             </a:extLst>
           </p:cNvPr>
@@ -7509,10 +8507,10 @@
       </p:pic>
       <p:pic>
         <p:nvPicPr>
-          <p:cNvPr id="11" name="Picture 10">
-            <a:extLst>
-              <a:ext uri="{FF2B5EF4-FFF2-40B4-BE49-F238E27FC236}">
-                <a16:creationId xmlns:a16="http://schemas.microsoft.com/office/drawing/2014/main" id="{287FAA8F-62B6-C44A-9B60-F356378D0B98}"/>
+          <p:cNvPr id="21" name="Picture 20">
+            <a:extLst>
+              <a:ext uri="{FF2B5EF4-FFF2-40B4-BE49-F238E27FC236}">
+                <a16:creationId xmlns:a16="http://schemas.microsoft.com/office/drawing/2014/main" id="{CD669DAB-A049-5E6C-BCFA-59D9F426EB25}"/>
               </a:ext>
             </a:extLst>
           </p:cNvPr>
@@ -7540,7 +8538,7 @@
     </p:spTree>
     <p:extLst>
       <p:ext uri="{BB962C8B-B14F-4D97-AF65-F5344CB8AC3E}">
-        <p14:creationId xmlns:p14="http://schemas.microsoft.com/office/powerpoint/2010/main" val="3993840726"/>
+        <p14:creationId xmlns:p14="http://schemas.microsoft.com/office/powerpoint/2010/main" val="850539854"/>
       </p:ext>
     </p:extLst>
   </p:cSld>

</xml_diff>